<commit_message>
finalized project and updated report
</commit_message>
<xml_diff>
--- a/Report/Final Presentation Slides.pptx
+++ b/Report/Final Presentation Slides.pptx
@@ -272,7 +272,7 @@
       </p15:sldGuideLst>
     </p:ext>
     <p:ext uri="http://customooxmlschemas.google.com/">
-      <go:slidesCustomData xmlns:go="http://customooxmlschemas.google.com/" xmlns:p15="http://schemas.microsoft.com/office/powerpoint/2012/main" xmlns:p14="http://schemas.microsoft.com/office/powerpoint/2010/main" xmlns:com="http://schemas.openxmlformats.org/drawingml/2006/compatibility" xmlns:pvml="urn:schemas-microsoft-com:office:powerpoint" xmlns:v="urn:schemas-microsoft-com:vml" xmlns:o="urn:schemas-microsoft-com:office:office" xmlns:dgm="http://schemas.openxmlformats.org/drawingml/2006/diagram" xmlns:c="http://schemas.openxmlformats.org/drawingml/2006/chart" xmlns:mv="urn:schemas-microsoft-com:mac:vml" xmlns:mc="http://schemas.openxmlformats.org/markup-compatibility/2006" xmlns="" r:id="rId23" roundtripDataSignature="AMtx7mjulLEx3j5KoI4qvfzWHaI9fLfvVg=="/>
+      <go:slidesCustomData xmlns="" xmlns:mc="http://schemas.openxmlformats.org/markup-compatibility/2006" xmlns:mv="urn:schemas-microsoft-com:mac:vml" xmlns:c="http://schemas.openxmlformats.org/drawingml/2006/chart" xmlns:dgm="http://schemas.openxmlformats.org/drawingml/2006/diagram" xmlns:o="urn:schemas-microsoft-com:office:office" xmlns:v="urn:schemas-microsoft-com:vml" xmlns:pvml="urn:schemas-microsoft-com:office:powerpoint" xmlns:com="http://schemas.openxmlformats.org/drawingml/2006/compatibility" xmlns:p14="http://schemas.microsoft.com/office/powerpoint/2010/main" xmlns:p15="http://schemas.microsoft.com/office/powerpoint/2012/main" xmlns:go="http://customooxmlschemas.google.com/" r:id="rId23" roundtripDataSignature="AMtx7mjulLEx3j5KoI4qvfzWHaI9fLfvVg=="/>
     </p:ext>
   </p:extLst>
 </p:presentation>
@@ -3769,7 +3769,7 @@
             </a:pPr>
             <a:fld id="{00000000-1234-1234-1234-123412341234}" type="slidenum">
               <a:rPr lang="en"/>
-              <a:t>‹N°›</a:t>
+              <a:t>‹#›</a:t>
             </a:fld>
             <a:endParaRPr/>
           </a:p>
@@ -4745,7 +4745,7 @@
             </a:pPr>
             <a:fld id="{00000000-1234-1234-1234-123412341234}" type="slidenum">
               <a:rPr lang="en"/>
-              <a:t>‹N°›</a:t>
+              <a:t>‹#›</a:t>
             </a:fld>
             <a:endParaRPr/>
           </a:p>
@@ -5721,7 +5721,7 @@
             </a:pPr>
             <a:fld id="{00000000-1234-1234-1234-123412341234}" type="slidenum">
               <a:rPr lang="en"/>
-              <a:t>‹N°›</a:t>
+              <a:t>‹#›</a:t>
             </a:fld>
             <a:endParaRPr/>
           </a:p>
@@ -6697,7 +6697,7 @@
             </a:pPr>
             <a:fld id="{00000000-1234-1234-1234-123412341234}" type="slidenum">
               <a:rPr lang="en"/>
-              <a:t>‹N°›</a:t>
+              <a:t>‹#›</a:t>
             </a:fld>
             <a:endParaRPr/>
           </a:p>
@@ -7710,7 +7710,7 @@
             </a:pPr>
             <a:fld id="{00000000-1234-1234-1234-123412341234}" type="slidenum">
               <a:rPr lang="en"/>
-              <a:t>‹N°›</a:t>
+              <a:t>‹#›</a:t>
             </a:fld>
             <a:endParaRPr/>
           </a:p>
@@ -8873,7 +8873,7 @@
             </a:pPr>
             <a:fld id="{00000000-1234-1234-1234-123412341234}" type="slidenum">
               <a:rPr lang="en"/>
-              <a:t>‹N°›</a:t>
+              <a:t>‹#›</a:t>
             </a:fld>
             <a:endParaRPr/>
           </a:p>
@@ -10410,7 +10410,7 @@
             </a:pPr>
             <a:fld id="{00000000-1234-1234-1234-123412341234}" type="slidenum">
               <a:rPr lang="en"/>
-              <a:t>‹N°›</a:t>
+              <a:t>‹#›</a:t>
             </a:fld>
             <a:endParaRPr/>
           </a:p>
@@ -11199,7 +11199,7 @@
             </a:pPr>
             <a:fld id="{00000000-1234-1234-1234-123412341234}" type="slidenum">
               <a:rPr lang="en"/>
-              <a:t>‹N°›</a:t>
+              <a:t>‹#›</a:t>
             </a:fld>
             <a:endParaRPr/>
           </a:p>
@@ -11825,7 +11825,7 @@
             </a:pPr>
             <a:fld id="{00000000-1234-1234-1234-123412341234}" type="slidenum">
               <a:rPr lang="en"/>
-              <a:t>‹N°›</a:t>
+              <a:t>‹#›</a:t>
             </a:fld>
             <a:endParaRPr/>
           </a:p>
@@ -12989,7 +12989,7 @@
             </a:pPr>
             <a:fld id="{00000000-1234-1234-1234-123412341234}" type="slidenum">
               <a:rPr lang="en"/>
-              <a:t>‹N°›</a:t>
+              <a:t>‹#›</a:t>
             </a:fld>
             <a:endParaRPr/>
           </a:p>
@@ -14234,7 +14234,7 @@
             </a:pPr>
             <a:fld id="{00000000-1234-1234-1234-123412341234}" type="slidenum">
               <a:rPr lang="en"/>
-              <a:t>‹N°›</a:t>
+              <a:t>‹#›</a:t>
             </a:fld>
             <a:endParaRPr/>
           </a:p>
@@ -15357,7 +15357,7 @@
             </a:pPr>
             <a:fld id="{00000000-1234-1234-1234-123412341234}" type="slidenum">
               <a:rPr lang="en"/>
-              <a:t>‹N°›</a:t>
+              <a:t>‹#›</a:t>
             </a:fld>
             <a:endParaRPr/>
           </a:p>

</xml_diff>